<commit_message>
support alpha&beta and batch-gemm
</commit_message>
<xml_diff>
--- a/doc/480x512 kernel analysis.pptx
+++ b/doc/480x512 kernel analysis.pptx
@@ -5,14 +5,16 @@
     <p:sldMasterId id="2147483891" r:id="rId3"/>
   </p:sldMasterIdLst>
   <p:notesMasterIdLst>
-    <p:notesMasterId r:id="rId6"/>
+    <p:notesMasterId r:id="rId8"/>
   </p:notesMasterIdLst>
   <p:handoutMasterIdLst>
-    <p:handoutMasterId r:id="rId7"/>
+    <p:handoutMasterId r:id="rId9"/>
   </p:handoutMasterIdLst>
   <p:sldIdLst>
     <p:sldId id="2022" r:id="rId4"/>
     <p:sldId id="2027" r:id="rId5"/>
+    <p:sldId id="2028" r:id="rId6"/>
+    <p:sldId id="2029" r:id="rId7"/>
   </p:sldIdLst>
   <p:sldSz cx="12188825" cy="6858000"/>
   <p:notesSz cx="6858000" cy="4819650"/>
@@ -148,6 +150,8 @@
           <p14:sldIdLst>
             <p14:sldId id="2022"/>
             <p14:sldId id="2027"/>
+            <p14:sldId id="2028"/>
+            <p14:sldId id="2029"/>
           </p14:sldIdLst>
         </p14:section>
       </p14:sectionLst>
@@ -327,7 +331,7 @@
               <a:pPr>
                 <a:defRPr/>
               </a:pPr>
-              <a:t>5/28/2020</a:t>
+              <a:t>6/1/2020</a:t>
             </a:fld>
             <a:endParaRPr lang="en-US"/>
           </a:p>
@@ -546,7 +550,7 @@
               <a:pPr>
                 <a:defRPr/>
               </a:pPr>
-              <a:t>5/28/2020</a:t>
+              <a:t>6/1/2020</a:t>
             </a:fld>
             <a:endParaRPr lang="en-US"/>
           </a:p>
@@ -3622,6 +3626,1203 @@
     <p:extLst>
       <p:ext uri="{BB962C8B-B14F-4D97-AF65-F5344CB8AC3E}">
         <p14:creationId xmlns:p14="http://schemas.microsoft.com/office/powerpoint/2010/main" val="2688362384"/>
+      </p:ext>
+    </p:extLst>
+  </p:cSld>
+  <p:clrMapOvr>
+    <a:masterClrMapping/>
+  </p:clrMapOvr>
+</p:sld>
+</file>
+
+<file path=ppt/slides/slide3.xml><?xml version="1.0" encoding="utf-8"?>
+<p:sld xmlns:a="http://schemas.openxmlformats.org/drawingml/2006/main" xmlns:r="http://schemas.openxmlformats.org/officeDocument/2006/relationships" xmlns:p="http://schemas.openxmlformats.org/presentationml/2006/main">
+  <p:cSld>
+    <p:spTree>
+      <p:nvGrpSpPr>
+        <p:cNvPr id="1" name=""/>
+        <p:cNvGrpSpPr/>
+        <p:nvPr/>
+      </p:nvGrpSpPr>
+      <p:grpSpPr>
+        <a:xfrm>
+          <a:off x="0" y="0"/>
+          <a:ext cx="0" cy="0"/>
+          <a:chOff x="0" y="0"/>
+          <a:chExt cx="0" cy="0"/>
+        </a:xfrm>
+      </p:grpSpPr>
+      <p:sp>
+        <p:nvSpPr>
+          <p:cNvPr id="2" name="Content Placeholder 1">
+            <a:extLst>
+              <a:ext uri="{FF2B5EF4-FFF2-40B4-BE49-F238E27FC236}">
+                <a16:creationId xmlns:a16="http://schemas.microsoft.com/office/drawing/2014/main" id="{62F0C778-32F6-4750-AA9D-CF74A2AD5ADD}"/>
+              </a:ext>
+            </a:extLst>
+          </p:cNvPr>
+          <p:cNvSpPr>
+            <a:spLocks noGrp="1"/>
+          </p:cNvSpPr>
+          <p:nvPr>
+            <p:ph idx="1"/>
+          </p:nvPr>
+        </p:nvSpPr>
+        <p:spPr>
+          <a:xfrm>
+            <a:off x="313245" y="1038224"/>
+            <a:ext cx="11338560" cy="5280659"/>
+          </a:xfrm>
+        </p:spPr>
+        <p:txBody>
+          <a:bodyPr/>
+          <a:lstStyle/>
+          <a:p>
+            <a:r>
+              <a:rPr lang="en-US" sz="2200" b="1" dirty="0"/>
+              <a:t>Main</a:t>
+            </a:r>
+            <a:r>
+              <a:rPr lang="zh-CN" altLang="en-US" sz="2200" b="1" dirty="0"/>
+              <a:t> </a:t>
+            </a:r>
+            <a:r>
+              <a:rPr lang="en-US" altLang="zh-CN" sz="2200" b="1" dirty="0"/>
+              <a:t>loop</a:t>
+            </a:r>
+            <a:r>
+              <a:rPr lang="zh-CN" altLang="en-US" sz="2200" b="1" dirty="0"/>
+              <a:t> </a:t>
+            </a:r>
+            <a:r>
+              <a:rPr lang="en-US" altLang="zh-CN" sz="2200" b="1" dirty="0"/>
+              <a:t>elapsed</a:t>
+            </a:r>
+            <a:r>
+              <a:rPr lang="zh-CN" altLang="en-US" sz="2200" b="1" dirty="0"/>
+              <a:t> </a:t>
+            </a:r>
+            <a:r>
+              <a:rPr lang="en-US" altLang="zh-CN" sz="2200" b="1" dirty="0"/>
+              <a:t>time</a:t>
+            </a:r>
+            <a:endParaRPr lang="en-US" sz="2200" b="1" dirty="0"/>
+          </a:p>
+        </p:txBody>
+      </p:sp>
+      <p:sp>
+        <p:nvSpPr>
+          <p:cNvPr id="3" name="Title 2">
+            <a:extLst>
+              <a:ext uri="{FF2B5EF4-FFF2-40B4-BE49-F238E27FC236}">
+                <a16:creationId xmlns:a16="http://schemas.microsoft.com/office/drawing/2014/main" id="{CEDC0840-5118-4BFD-899F-D50C1A686498}"/>
+              </a:ext>
+            </a:extLst>
+          </p:cNvPr>
+          <p:cNvSpPr>
+            <a:spLocks noGrp="1"/>
+          </p:cNvSpPr>
+          <p:nvPr>
+            <p:ph type="title"/>
+          </p:nvPr>
+        </p:nvSpPr>
+        <p:spPr/>
+        <p:txBody>
+          <a:bodyPr/>
+          <a:lstStyle/>
+          <a:p>
+            <a:r>
+              <a:rPr lang="en-US" altLang="zh-CN" dirty="0"/>
+              <a:t>480 </a:t>
+            </a:r>
+            <a:r>
+              <a:rPr lang="zh-CN" altLang="en-US" dirty="0"/>
+              <a:t>* </a:t>
+            </a:r>
+            <a:r>
+              <a:rPr lang="en-US" altLang="zh-CN" dirty="0"/>
+              <a:t>512 kernel analysis</a:t>
+            </a:r>
+            <a:endParaRPr lang="en-US" dirty="0"/>
+          </a:p>
+        </p:txBody>
+      </p:sp>
+      <p:sp>
+        <p:nvSpPr>
+          <p:cNvPr id="4" name="Text Placeholder 3">
+            <a:extLst>
+              <a:ext uri="{FF2B5EF4-FFF2-40B4-BE49-F238E27FC236}">
+                <a16:creationId xmlns:a16="http://schemas.microsoft.com/office/drawing/2014/main" id="{23BC3E91-3C7D-4DD3-9DC0-25A44DC2381D}"/>
+              </a:ext>
+            </a:extLst>
+          </p:cNvPr>
+          <p:cNvSpPr>
+            <a:spLocks noGrp="1"/>
+          </p:cNvSpPr>
+          <p:nvPr>
+            <p:ph type="body" sz="quarter" idx="10"/>
+          </p:nvPr>
+        </p:nvSpPr>
+        <p:spPr/>
+        <p:txBody>
+          <a:bodyPr/>
+          <a:lstStyle/>
+          <a:p>
+            <a:endParaRPr lang="en-US" dirty="0"/>
+          </a:p>
+        </p:txBody>
+      </p:sp>
+      <p:pic>
+        <p:nvPicPr>
+          <p:cNvPr id="6" name="Picture 5" descr="A screenshot of a cell phone&#10;&#10;Description automatically generated">
+            <a:extLst>
+              <a:ext uri="{FF2B5EF4-FFF2-40B4-BE49-F238E27FC236}">
+                <a16:creationId xmlns:a16="http://schemas.microsoft.com/office/drawing/2014/main" id="{80976E5A-DD5A-4BD0-A594-9D479C4AF0BE}"/>
+              </a:ext>
+            </a:extLst>
+          </p:cNvPr>
+          <p:cNvPicPr>
+            <a:picLocks noChangeAspect="1"/>
+          </p:cNvPicPr>
+          <p:nvPr/>
+        </p:nvPicPr>
+        <p:blipFill>
+          <a:blip r:embed="rId2">
+            <a:extLst>
+              <a:ext uri="{28A0092B-C50C-407E-A947-70E740481C1C}">
+                <a14:useLocalDpi xmlns:a14="http://schemas.microsoft.com/office/drawing/2010/main" val="0"/>
+              </a:ext>
+            </a:extLst>
+          </a:blip>
+          <a:stretch>
+            <a:fillRect/>
+          </a:stretch>
+        </p:blipFill>
+        <p:spPr>
+          <a:xfrm>
+            <a:off x="537020" y="1496976"/>
+            <a:ext cx="2535247" cy="1595308"/>
+          </a:xfrm>
+          <a:prstGeom prst="rect">
+            <a:avLst/>
+          </a:prstGeom>
+        </p:spPr>
+      </p:pic>
+      <p:pic>
+        <p:nvPicPr>
+          <p:cNvPr id="9" name="Picture 8">
+            <a:extLst>
+              <a:ext uri="{FF2B5EF4-FFF2-40B4-BE49-F238E27FC236}">
+                <a16:creationId xmlns:a16="http://schemas.microsoft.com/office/drawing/2014/main" id="{351EBCE5-EBBE-466E-985F-FB1FF685882B}"/>
+              </a:ext>
+            </a:extLst>
+          </p:cNvPr>
+          <p:cNvPicPr>
+            <a:picLocks noChangeAspect="1"/>
+          </p:cNvPicPr>
+          <p:nvPr/>
+        </p:nvPicPr>
+        <p:blipFill>
+          <a:blip r:embed="rId3">
+            <a:extLst>
+              <a:ext uri="{28A0092B-C50C-407E-A947-70E740481C1C}">
+                <a14:useLocalDpi xmlns:a14="http://schemas.microsoft.com/office/drawing/2010/main" val="0"/>
+              </a:ext>
+            </a:extLst>
+          </a:blip>
+          <a:stretch>
+            <a:fillRect/>
+          </a:stretch>
+        </p:blipFill>
+        <p:spPr>
+          <a:xfrm>
+            <a:off x="225143" y="3239629"/>
+            <a:ext cx="11705020" cy="1906714"/>
+          </a:xfrm>
+          <a:prstGeom prst="rect">
+            <a:avLst/>
+          </a:prstGeom>
+        </p:spPr>
+      </p:pic>
+      <p:pic>
+        <p:nvPicPr>
+          <p:cNvPr id="8" name="Picture 7">
+            <a:extLst>
+              <a:ext uri="{FF2B5EF4-FFF2-40B4-BE49-F238E27FC236}">
+                <a16:creationId xmlns:a16="http://schemas.microsoft.com/office/drawing/2014/main" id="{F8620861-E86F-4055-A546-791FB6520674}"/>
+              </a:ext>
+            </a:extLst>
+          </p:cNvPr>
+          <p:cNvPicPr>
+            <a:picLocks noChangeAspect="1"/>
+          </p:cNvPicPr>
+          <p:nvPr/>
+        </p:nvPicPr>
+        <p:blipFill>
+          <a:blip r:embed="rId4">
+            <a:extLst>
+              <a:ext uri="{28A0092B-C50C-407E-A947-70E740481C1C}">
+                <a14:useLocalDpi xmlns:a14="http://schemas.microsoft.com/office/drawing/2010/main" val="0"/>
+              </a:ext>
+            </a:extLst>
+          </a:blip>
+          <a:stretch>
+            <a:fillRect/>
+          </a:stretch>
+        </p:blipFill>
+        <p:spPr>
+          <a:xfrm>
+            <a:off x="164915" y="5146343"/>
+            <a:ext cx="11858994" cy="959183"/>
+          </a:xfrm>
+          <a:prstGeom prst="rect">
+            <a:avLst/>
+          </a:prstGeom>
+        </p:spPr>
+      </p:pic>
+      <p:sp>
+        <p:nvSpPr>
+          <p:cNvPr id="13" name="Content Placeholder 1">
+            <a:extLst>
+              <a:ext uri="{FF2B5EF4-FFF2-40B4-BE49-F238E27FC236}">
+                <a16:creationId xmlns:a16="http://schemas.microsoft.com/office/drawing/2014/main" id="{DDEEBF5C-ED27-4D33-B2C0-28FF30B2DE60}"/>
+              </a:ext>
+            </a:extLst>
+          </p:cNvPr>
+          <p:cNvSpPr txBox="1">
+            <a:spLocks/>
+          </p:cNvSpPr>
+          <p:nvPr/>
+        </p:nvSpPr>
+        <p:spPr>
+          <a:xfrm>
+            <a:off x="3216288" y="1537007"/>
+            <a:ext cx="6111862" cy="1530089"/>
+          </a:xfrm>
+          <a:prstGeom prst="rect">
+            <a:avLst/>
+          </a:prstGeom>
+          <a:ln>
+            <a:solidFill>
+              <a:srgbClr val="FF0000"/>
+            </a:solidFill>
+            <a:prstDash val="dash"/>
+          </a:ln>
+        </p:spPr>
+        <p:txBody>
+          <a:bodyPr vert="horz" lIns="0" tIns="45720" rIns="0" bIns="45720" rtlCol="0">
+            <a:noAutofit/>
+          </a:bodyPr>
+          <a:lstStyle>
+            <a:lvl1pPr marL="342900" indent="-342900" algn="l" defTabSz="914400" rtl="0" eaLnBrk="1" latinLnBrk="0" hangingPunct="1">
+              <a:spcBef>
+                <a:spcPts val="800"/>
+              </a:spcBef>
+              <a:spcAft>
+                <a:spcPts val="0"/>
+              </a:spcAft>
+              <a:buClrTx/>
+              <a:buFont typeface="Arial" panose="020B0604020202020204" pitchFamily="34" charset="0"/>
+              <a:buChar char="•"/>
+              <a:defRPr sz="3000" kern="1200">
+                <a:solidFill>
+                  <a:schemeClr val="bg1"/>
+                </a:solidFill>
+                <a:latin typeface="Calibri" pitchFamily="34" charset="0"/>
+                <a:ea typeface="+mn-ea"/>
+                <a:cs typeface="+mn-cs"/>
+              </a:defRPr>
+            </a:lvl1pPr>
+            <a:lvl2pPr marL="548640" indent="-180975" algn="l" defTabSz="914400" rtl="0" eaLnBrk="1" latinLnBrk="0" hangingPunct="1">
+              <a:spcBef>
+                <a:spcPts val="300"/>
+              </a:spcBef>
+              <a:spcAft>
+                <a:spcPts val="0"/>
+              </a:spcAft>
+              <a:buClrTx/>
+              <a:buFont typeface="Arial" panose="020B0604020202020204" pitchFamily="34" charset="0"/>
+              <a:buChar char="•"/>
+              <a:defRPr sz="2600" kern="1200">
+                <a:solidFill>
+                  <a:schemeClr val="bg1"/>
+                </a:solidFill>
+                <a:latin typeface="Calibri" pitchFamily="34" charset="0"/>
+                <a:ea typeface="+mn-ea"/>
+                <a:cs typeface="+mn-cs"/>
+              </a:defRPr>
+            </a:lvl2pPr>
+            <a:lvl3pPr marL="914400" indent="-168275" algn="l" defTabSz="914400" rtl="0" eaLnBrk="1" latinLnBrk="0" hangingPunct="1">
+              <a:spcBef>
+                <a:spcPts val="300"/>
+              </a:spcBef>
+              <a:spcAft>
+                <a:spcPts val="0"/>
+              </a:spcAft>
+              <a:buClrTx/>
+              <a:buFont typeface="Arial" panose="020B0604020202020204" pitchFamily="34" charset="0"/>
+              <a:buChar char="•"/>
+              <a:defRPr sz="2200" kern="1200">
+                <a:solidFill>
+                  <a:schemeClr val="bg1"/>
+                </a:solidFill>
+                <a:latin typeface="Calibri" pitchFamily="34" charset="0"/>
+                <a:ea typeface="+mn-ea"/>
+                <a:cs typeface="+mn-cs"/>
+              </a:defRPr>
+            </a:lvl3pPr>
+            <a:lvl4pPr marL="1371600" indent="-182880" algn="l" defTabSz="914400" rtl="0" eaLnBrk="1" latinLnBrk="0" hangingPunct="1">
+              <a:spcBef>
+                <a:spcPts val="300"/>
+              </a:spcBef>
+              <a:buClrTx/>
+              <a:buFont typeface="Arial" panose="020B0604020202020204" pitchFamily="34" charset="0"/>
+              <a:buChar char="•"/>
+              <a:defRPr sz="1800" kern="1200">
+                <a:solidFill>
+                  <a:schemeClr val="bg1"/>
+                </a:solidFill>
+                <a:latin typeface="Calibri" pitchFamily="34" charset="0"/>
+                <a:ea typeface="+mn-ea"/>
+                <a:cs typeface="+mn-cs"/>
+              </a:defRPr>
+            </a:lvl4pPr>
+            <a:lvl5pPr marL="1645920" indent="-164592" algn="l" defTabSz="914400" rtl="0" eaLnBrk="1" latinLnBrk="0" hangingPunct="1">
+              <a:spcBef>
+                <a:spcPts val="300"/>
+              </a:spcBef>
+              <a:buClrTx/>
+              <a:buFont typeface="Arial" panose="020B0604020202020204" pitchFamily="34" charset="0"/>
+              <a:buChar char="•"/>
+              <a:defRPr sz="1400" kern="1200">
+                <a:solidFill>
+                  <a:schemeClr val="bg1"/>
+                </a:solidFill>
+                <a:latin typeface="Calibri" pitchFamily="34" charset="0"/>
+                <a:ea typeface="+mn-ea"/>
+                <a:cs typeface="+mn-cs"/>
+              </a:defRPr>
+            </a:lvl5pPr>
+            <a:lvl6pPr marL="2514600" indent="-228600" algn="l" defTabSz="914400" rtl="0" eaLnBrk="1" latinLnBrk="0" hangingPunct="1">
+              <a:spcBef>
+                <a:spcPct val="20000"/>
+              </a:spcBef>
+              <a:buFont typeface="Arial" pitchFamily="34" charset="0"/>
+              <a:buChar char="•"/>
+              <a:defRPr sz="2000" kern="1200">
+                <a:solidFill>
+                  <a:schemeClr val="tx1"/>
+                </a:solidFill>
+                <a:latin typeface="+mn-lt"/>
+                <a:ea typeface="+mn-ea"/>
+                <a:cs typeface="+mn-cs"/>
+              </a:defRPr>
+            </a:lvl6pPr>
+            <a:lvl7pPr marL="2971800" indent="-228600" algn="l" defTabSz="914400" rtl="0" eaLnBrk="1" latinLnBrk="0" hangingPunct="1">
+              <a:spcBef>
+                <a:spcPct val="20000"/>
+              </a:spcBef>
+              <a:buFont typeface="Arial" pitchFamily="34" charset="0"/>
+              <a:buChar char="•"/>
+              <a:defRPr sz="2000" kern="1200">
+                <a:solidFill>
+                  <a:schemeClr val="tx1"/>
+                </a:solidFill>
+                <a:latin typeface="+mn-lt"/>
+                <a:ea typeface="+mn-ea"/>
+                <a:cs typeface="+mn-cs"/>
+              </a:defRPr>
+            </a:lvl7pPr>
+            <a:lvl8pPr marL="3429000" indent="-228600" algn="l" defTabSz="914400" rtl="0" eaLnBrk="1" latinLnBrk="0" hangingPunct="1">
+              <a:spcBef>
+                <a:spcPct val="20000"/>
+              </a:spcBef>
+              <a:buFont typeface="Arial" pitchFamily="34" charset="0"/>
+              <a:buChar char="•"/>
+              <a:defRPr sz="2000" kern="1200">
+                <a:solidFill>
+                  <a:schemeClr val="tx1"/>
+                </a:solidFill>
+                <a:latin typeface="+mn-lt"/>
+                <a:ea typeface="+mn-ea"/>
+                <a:cs typeface="+mn-cs"/>
+              </a:defRPr>
+            </a:lvl8pPr>
+            <a:lvl9pPr marL="3886200" indent="-228600" algn="l" defTabSz="914400" rtl="0" eaLnBrk="1" latinLnBrk="0" hangingPunct="1">
+              <a:spcBef>
+                <a:spcPct val="20000"/>
+              </a:spcBef>
+              <a:buFont typeface="Arial" pitchFamily="34" charset="0"/>
+              <a:buChar char="•"/>
+              <a:defRPr sz="2000" kern="1200">
+                <a:solidFill>
+                  <a:schemeClr val="tx1"/>
+                </a:solidFill>
+                <a:latin typeface="+mn-lt"/>
+                <a:ea typeface="+mn-ea"/>
+                <a:cs typeface="+mn-cs"/>
+              </a:defRPr>
+            </a:lvl9pPr>
+          </a:lstStyle>
+          <a:p>
+            <a:pPr fontAlgn="auto"/>
+            <a:r>
+              <a:rPr lang="en-US" altLang="zh-CN" sz="2200" dirty="0"/>
+              <a:t>3bubbles</a:t>
+            </a:r>
+          </a:p>
+          <a:p>
+            <a:pPr marL="710565" lvl="1" indent="-342900" fontAlgn="auto">
+              <a:buFont typeface="+mj-lt"/>
+              <a:buAutoNum type="arabicPeriod"/>
+            </a:pPr>
+            <a:r>
+              <a:rPr lang="en-US" altLang="zh-CN" sz="1800" dirty="0"/>
+              <a:t>88 </a:t>
+            </a:r>
+            <a:r>
+              <a:rPr lang="en-US" altLang="zh-CN" sz="1800" dirty="0" err="1"/>
+              <a:t>clk</a:t>
+            </a:r>
+            <a:r>
+              <a:rPr lang="en-US" altLang="zh-CN" sz="1800" dirty="0"/>
+              <a:t> between </a:t>
+            </a:r>
+            <a:r>
+              <a:rPr lang="en-US" altLang="zh-CN" sz="1800" dirty="0" err="1"/>
+              <a:t>buff_load_A</a:t>
+            </a:r>
+            <a:r>
+              <a:rPr lang="en-US" altLang="zh-CN" sz="1800" dirty="0"/>
+              <a:t> and </a:t>
+            </a:r>
+            <a:r>
+              <a:rPr lang="en-US" altLang="zh-CN" sz="1800" dirty="0" err="1"/>
+              <a:t>buffer_load_B</a:t>
+            </a:r>
+            <a:r>
+              <a:rPr lang="en-US" altLang="zh-CN" sz="1800" dirty="0"/>
+              <a:t> (13.7%)</a:t>
+            </a:r>
+          </a:p>
+          <a:p>
+            <a:pPr marL="710565" lvl="1" indent="-342900" fontAlgn="auto">
+              <a:buFont typeface="+mj-lt"/>
+              <a:buAutoNum type="arabicPeriod"/>
+            </a:pPr>
+            <a:r>
+              <a:rPr lang="en-US" altLang="zh-CN" sz="1800" dirty="0"/>
+              <a:t>300 </a:t>
+            </a:r>
+            <a:r>
+              <a:rPr lang="en-US" altLang="zh-CN" sz="1800" dirty="0" err="1"/>
+              <a:t>clk</a:t>
+            </a:r>
+            <a:r>
+              <a:rPr lang="en-US" altLang="zh-CN" sz="1800" dirty="0"/>
+              <a:t> between </a:t>
+            </a:r>
+            <a:r>
+              <a:rPr lang="en-US" altLang="zh-CN" sz="1800" dirty="0" err="1"/>
+              <a:t>buff_load</a:t>
+            </a:r>
+            <a:r>
+              <a:rPr lang="en-US" altLang="zh-CN" sz="1800" dirty="0"/>
+              <a:t> and </a:t>
+            </a:r>
+            <a:r>
+              <a:rPr lang="en-US" altLang="zh-CN" sz="1800" dirty="0" err="1"/>
+              <a:t>addr</a:t>
+            </a:r>
+            <a:r>
+              <a:rPr lang="en-US" altLang="zh-CN" sz="1800" dirty="0"/>
+              <a:t> </a:t>
+            </a:r>
+            <a:r>
+              <a:rPr lang="en-US" altLang="zh-CN" sz="1800" dirty="0" err="1"/>
+              <a:t>calcu</a:t>
+            </a:r>
+            <a:r>
+              <a:rPr lang="en-US" altLang="zh-CN" sz="1800" dirty="0"/>
+              <a:t> (41.2%)</a:t>
+            </a:r>
+          </a:p>
+          <a:p>
+            <a:pPr marL="710565" lvl="1" indent="-342900" fontAlgn="auto">
+              <a:buFont typeface="+mj-lt"/>
+              <a:buAutoNum type="arabicPeriod"/>
+            </a:pPr>
+            <a:r>
+              <a:rPr lang="en-US" altLang="zh-CN" sz="1800" dirty="0"/>
+              <a:t>Math wave waits fetch wave 280 </a:t>
+            </a:r>
+            <a:r>
+              <a:rPr lang="en-US" altLang="zh-CN" sz="1800" dirty="0" err="1"/>
+              <a:t>clk</a:t>
+            </a:r>
+            <a:r>
+              <a:rPr lang="en-US" altLang="zh-CN" sz="1800" dirty="0"/>
+              <a:t> (38.5%)</a:t>
+            </a:r>
+          </a:p>
+          <a:p>
+            <a:pPr fontAlgn="auto"/>
+            <a:endParaRPr lang="en-US" sz="2200" dirty="0"/>
+          </a:p>
+        </p:txBody>
+      </p:sp>
+      <p:sp>
+        <p:nvSpPr>
+          <p:cNvPr id="14" name="Rectangle: Rounded Corners 13">
+            <a:extLst>
+              <a:ext uri="{FF2B5EF4-FFF2-40B4-BE49-F238E27FC236}">
+                <a16:creationId xmlns:a16="http://schemas.microsoft.com/office/drawing/2014/main" id="{D19996ED-9A30-467D-953B-6B7039F45126}"/>
+              </a:ext>
+            </a:extLst>
+          </p:cNvPr>
+          <p:cNvSpPr/>
+          <p:nvPr/>
+        </p:nvSpPr>
+        <p:spPr>
+          <a:xfrm>
+            <a:off x="2742067" y="4231514"/>
+            <a:ext cx="660400" cy="333707"/>
+          </a:xfrm>
+          <a:prstGeom prst="roundRect">
+            <a:avLst/>
+          </a:prstGeom>
+          <a:noFill/>
+          <a:ln>
+            <a:solidFill>
+              <a:srgbClr val="ED1C24"/>
+            </a:solidFill>
+          </a:ln>
+          <a:effectLst/>
+        </p:spPr>
+        <p:style>
+          <a:lnRef idx="2">
+            <a:schemeClr val="accent1">
+              <a:shade val="50000"/>
+            </a:schemeClr>
+          </a:lnRef>
+          <a:fillRef idx="1">
+            <a:schemeClr val="accent1"/>
+          </a:fillRef>
+          <a:effectRef idx="0">
+            <a:schemeClr val="accent1"/>
+          </a:effectRef>
+          <a:fontRef idx="minor">
+            <a:schemeClr val="lt1"/>
+          </a:fontRef>
+        </p:style>
+        <p:txBody>
+          <a:bodyPr rtlCol="0" anchor="ctr"/>
+          <a:lstStyle/>
+          <a:p>
+            <a:pPr algn="ctr"/>
+            <a:r>
+              <a:rPr lang="en-US" b="1" dirty="0">
+                <a:solidFill>
+                  <a:srgbClr val="FF0000"/>
+                </a:solidFill>
+              </a:rPr>
+              <a:t>1</a:t>
+            </a:r>
+          </a:p>
+        </p:txBody>
+      </p:sp>
+      <p:sp>
+        <p:nvSpPr>
+          <p:cNvPr id="15" name="Rectangle: Rounded Corners 14">
+            <a:extLst>
+              <a:ext uri="{FF2B5EF4-FFF2-40B4-BE49-F238E27FC236}">
+                <a16:creationId xmlns:a16="http://schemas.microsoft.com/office/drawing/2014/main" id="{D55EDA7A-1568-4A70-AE14-7AF831E47423}"/>
+              </a:ext>
+            </a:extLst>
+          </p:cNvPr>
+          <p:cNvSpPr/>
+          <p:nvPr/>
+        </p:nvSpPr>
+        <p:spPr>
+          <a:xfrm>
+            <a:off x="3911600" y="4239636"/>
+            <a:ext cx="1866900" cy="333707"/>
+          </a:xfrm>
+          <a:prstGeom prst="roundRect">
+            <a:avLst/>
+          </a:prstGeom>
+          <a:noFill/>
+          <a:ln>
+            <a:solidFill>
+              <a:srgbClr val="ED1C24"/>
+            </a:solidFill>
+          </a:ln>
+          <a:effectLst/>
+        </p:spPr>
+        <p:style>
+          <a:lnRef idx="2">
+            <a:schemeClr val="accent1">
+              <a:shade val="50000"/>
+            </a:schemeClr>
+          </a:lnRef>
+          <a:fillRef idx="1">
+            <a:schemeClr val="accent1"/>
+          </a:fillRef>
+          <a:effectRef idx="0">
+            <a:schemeClr val="accent1"/>
+          </a:effectRef>
+          <a:fontRef idx="minor">
+            <a:schemeClr val="lt1"/>
+          </a:fontRef>
+        </p:style>
+        <p:txBody>
+          <a:bodyPr rtlCol="0" anchor="ctr"/>
+          <a:lstStyle/>
+          <a:p>
+            <a:pPr algn="ctr"/>
+            <a:r>
+              <a:rPr lang="en-US" b="1" dirty="0">
+                <a:solidFill>
+                  <a:srgbClr val="FF0000"/>
+                </a:solidFill>
+              </a:rPr>
+              <a:t>2</a:t>
+            </a:r>
+          </a:p>
+        </p:txBody>
+      </p:sp>
+      <p:sp>
+        <p:nvSpPr>
+          <p:cNvPr id="16" name="Rectangle: Rounded Corners 15">
+            <a:extLst>
+              <a:ext uri="{FF2B5EF4-FFF2-40B4-BE49-F238E27FC236}">
+                <a16:creationId xmlns:a16="http://schemas.microsoft.com/office/drawing/2014/main" id="{BAAC225B-B8A0-407C-9AE7-5649F46837DE}"/>
+              </a:ext>
+            </a:extLst>
+          </p:cNvPr>
+          <p:cNvSpPr/>
+          <p:nvPr/>
+        </p:nvSpPr>
+        <p:spPr>
+          <a:xfrm>
+            <a:off x="5384800" y="3280453"/>
+            <a:ext cx="1790700" cy="834347"/>
+          </a:xfrm>
+          <a:prstGeom prst="roundRect">
+            <a:avLst/>
+          </a:prstGeom>
+          <a:noFill/>
+          <a:ln>
+            <a:solidFill>
+              <a:srgbClr val="ED1C24"/>
+            </a:solidFill>
+          </a:ln>
+          <a:effectLst/>
+        </p:spPr>
+        <p:style>
+          <a:lnRef idx="2">
+            <a:schemeClr val="accent1">
+              <a:shade val="50000"/>
+            </a:schemeClr>
+          </a:lnRef>
+          <a:fillRef idx="1">
+            <a:schemeClr val="accent1"/>
+          </a:fillRef>
+          <a:effectRef idx="0">
+            <a:schemeClr val="accent1"/>
+          </a:effectRef>
+          <a:fontRef idx="minor">
+            <a:schemeClr val="lt1"/>
+          </a:fontRef>
+        </p:style>
+        <p:txBody>
+          <a:bodyPr rtlCol="0" anchor="ctr"/>
+          <a:lstStyle/>
+          <a:p>
+            <a:pPr algn="ctr"/>
+            <a:r>
+              <a:rPr lang="en-US" b="1" dirty="0">
+                <a:solidFill>
+                  <a:srgbClr val="FF0000"/>
+                </a:solidFill>
+              </a:rPr>
+              <a:t>3</a:t>
+            </a:r>
+          </a:p>
+        </p:txBody>
+      </p:sp>
+      <p:cxnSp>
+        <p:nvCxnSpPr>
+          <p:cNvPr id="18" name="Straight Arrow Connector 17">
+            <a:extLst>
+              <a:ext uri="{FF2B5EF4-FFF2-40B4-BE49-F238E27FC236}">
+                <a16:creationId xmlns:a16="http://schemas.microsoft.com/office/drawing/2014/main" id="{821A29AE-8DD4-42F2-B6E0-60CCC97F8B93}"/>
+              </a:ext>
+            </a:extLst>
+          </p:cNvPr>
+          <p:cNvCxnSpPr>
+            <a:cxnSpLocks/>
+            <a:stCxn id="14" idx="2"/>
+          </p:cNvCxnSpPr>
+          <p:nvPr/>
+        </p:nvCxnSpPr>
+        <p:spPr>
+          <a:xfrm>
+            <a:off x="3072267" y="4565221"/>
+            <a:ext cx="485117" cy="1162244"/>
+          </a:xfrm>
+          <a:prstGeom prst="straightConnector1">
+            <a:avLst/>
+          </a:prstGeom>
+          <a:ln>
+            <a:solidFill>
+              <a:srgbClr val="FF0000"/>
+            </a:solidFill>
+            <a:tailEnd type="triangle"/>
+          </a:ln>
+        </p:spPr>
+        <p:style>
+          <a:lnRef idx="1">
+            <a:schemeClr val="accent1"/>
+          </a:lnRef>
+          <a:fillRef idx="0">
+            <a:schemeClr val="accent1"/>
+          </a:fillRef>
+          <a:effectRef idx="0">
+            <a:schemeClr val="accent1"/>
+          </a:effectRef>
+          <a:fontRef idx="minor">
+            <a:schemeClr val="tx1"/>
+          </a:fontRef>
+        </p:style>
+      </p:cxnSp>
+      <p:cxnSp>
+        <p:nvCxnSpPr>
+          <p:cNvPr id="19" name="Straight Arrow Connector 18">
+            <a:extLst>
+              <a:ext uri="{FF2B5EF4-FFF2-40B4-BE49-F238E27FC236}">
+                <a16:creationId xmlns:a16="http://schemas.microsoft.com/office/drawing/2014/main" id="{F142EA5B-2F5E-418B-8447-5A672EF0BED2}"/>
+              </a:ext>
+            </a:extLst>
+          </p:cNvPr>
+          <p:cNvCxnSpPr>
+            <a:cxnSpLocks/>
+            <a:stCxn id="15" idx="2"/>
+          </p:cNvCxnSpPr>
+          <p:nvPr/>
+        </p:nvCxnSpPr>
+        <p:spPr>
+          <a:xfrm>
+            <a:off x="4845050" y="4573343"/>
+            <a:ext cx="2749550" cy="1129401"/>
+          </a:xfrm>
+          <a:prstGeom prst="straightConnector1">
+            <a:avLst/>
+          </a:prstGeom>
+          <a:ln>
+            <a:solidFill>
+              <a:srgbClr val="FF0000"/>
+            </a:solidFill>
+            <a:tailEnd type="triangle"/>
+          </a:ln>
+        </p:spPr>
+        <p:style>
+          <a:lnRef idx="1">
+            <a:schemeClr val="accent1"/>
+          </a:lnRef>
+          <a:fillRef idx="0">
+            <a:schemeClr val="accent1"/>
+          </a:fillRef>
+          <a:effectRef idx="0">
+            <a:schemeClr val="accent1"/>
+          </a:effectRef>
+          <a:fontRef idx="minor">
+            <a:schemeClr val="tx1"/>
+          </a:fontRef>
+        </p:style>
+      </p:cxnSp>
+      <p:cxnSp>
+        <p:nvCxnSpPr>
+          <p:cNvPr id="22" name="Straight Arrow Connector 21">
+            <a:extLst>
+              <a:ext uri="{FF2B5EF4-FFF2-40B4-BE49-F238E27FC236}">
+                <a16:creationId xmlns:a16="http://schemas.microsoft.com/office/drawing/2014/main" id="{7BDDC4F8-910F-441D-B9B6-CE1065704131}"/>
+              </a:ext>
+            </a:extLst>
+          </p:cNvPr>
+          <p:cNvCxnSpPr>
+            <a:cxnSpLocks/>
+            <a:stCxn id="16" idx="3"/>
+          </p:cNvCxnSpPr>
+          <p:nvPr/>
+        </p:nvCxnSpPr>
+        <p:spPr>
+          <a:xfrm>
+            <a:off x="7175500" y="3697627"/>
+            <a:ext cx="2952750" cy="1634327"/>
+          </a:xfrm>
+          <a:prstGeom prst="straightConnector1">
+            <a:avLst/>
+          </a:prstGeom>
+          <a:ln>
+            <a:solidFill>
+              <a:srgbClr val="FF0000"/>
+            </a:solidFill>
+            <a:tailEnd type="triangle"/>
+          </a:ln>
+        </p:spPr>
+        <p:style>
+          <a:lnRef idx="1">
+            <a:schemeClr val="accent1"/>
+          </a:lnRef>
+          <a:fillRef idx="0">
+            <a:schemeClr val="accent1"/>
+          </a:fillRef>
+          <a:effectRef idx="0">
+            <a:schemeClr val="accent1"/>
+          </a:effectRef>
+          <a:fontRef idx="minor">
+            <a:schemeClr val="tx1"/>
+          </a:fontRef>
+        </p:style>
+      </p:cxnSp>
+    </p:spTree>
+    <p:extLst>
+      <p:ext uri="{BB962C8B-B14F-4D97-AF65-F5344CB8AC3E}">
+        <p14:creationId xmlns:p14="http://schemas.microsoft.com/office/powerpoint/2010/main" val="1322351277"/>
+      </p:ext>
+    </p:extLst>
+  </p:cSld>
+  <p:clrMapOvr>
+    <a:masterClrMapping/>
+  </p:clrMapOvr>
+</p:sld>
+</file>
+
+<file path=ppt/slides/slide4.xml><?xml version="1.0" encoding="utf-8"?>
+<p:sld xmlns:a="http://schemas.openxmlformats.org/drawingml/2006/main" xmlns:r="http://schemas.openxmlformats.org/officeDocument/2006/relationships" xmlns:p="http://schemas.openxmlformats.org/presentationml/2006/main">
+  <p:cSld>
+    <p:spTree>
+      <p:nvGrpSpPr>
+        <p:cNvPr id="1" name=""/>
+        <p:cNvGrpSpPr/>
+        <p:nvPr/>
+      </p:nvGrpSpPr>
+      <p:grpSpPr>
+        <a:xfrm>
+          <a:off x="0" y="0"/>
+          <a:ext cx="0" cy="0"/>
+          <a:chOff x="0" y="0"/>
+          <a:chExt cx="0" cy="0"/>
+        </a:xfrm>
+      </p:grpSpPr>
+      <p:sp>
+        <p:nvSpPr>
+          <p:cNvPr id="2" name="Content Placeholder 1">
+            <a:extLst>
+              <a:ext uri="{FF2B5EF4-FFF2-40B4-BE49-F238E27FC236}">
+                <a16:creationId xmlns:a16="http://schemas.microsoft.com/office/drawing/2014/main" id="{62F0C778-32F6-4750-AA9D-CF74A2AD5ADD}"/>
+              </a:ext>
+            </a:extLst>
+          </p:cNvPr>
+          <p:cNvSpPr>
+            <a:spLocks noGrp="1"/>
+          </p:cNvSpPr>
+          <p:nvPr>
+            <p:ph idx="1"/>
+          </p:nvPr>
+        </p:nvSpPr>
+        <p:spPr>
+          <a:xfrm>
+            <a:off x="313245" y="1038224"/>
+            <a:ext cx="11338560" cy="5280659"/>
+          </a:xfrm>
+        </p:spPr>
+        <p:txBody>
+          <a:bodyPr/>
+          <a:lstStyle/>
+          <a:p>
+            <a:r>
+              <a:rPr lang="en-US" sz="2200" b="1" dirty="0"/>
+              <a:t>Bottle neck of main loop</a:t>
+            </a:r>
+          </a:p>
+          <a:p>
+            <a:pPr lvl="1"/>
+            <a:r>
+              <a:rPr lang="en-US" sz="1800" dirty="0"/>
+              <a:t>Remove all </a:t>
+            </a:r>
+            <a:r>
+              <a:rPr lang="en-US" sz="1800" dirty="0" err="1"/>
+              <a:t>lds</a:t>
+            </a:r>
+            <a:r>
+              <a:rPr lang="en-US" sz="1800" dirty="0"/>
+              <a:t> read instr. In math wave. </a:t>
+            </a:r>
+          </a:p>
+          <a:p>
+            <a:pPr lvl="2"/>
+            <a:r>
+              <a:rPr lang="en-US" sz="1400" dirty="0" err="1"/>
+              <a:t>Lds</a:t>
+            </a:r>
+            <a:r>
+              <a:rPr lang="en-US" sz="1400" dirty="0"/>
+              <a:t> read will not effect </a:t>
+            </a:r>
+            <a:r>
+              <a:rPr lang="en-US" sz="1400" dirty="0" err="1"/>
+              <a:t>lds</a:t>
+            </a:r>
+            <a:r>
+              <a:rPr lang="en-US" sz="1400" dirty="0"/>
+              <a:t> write in fetch wave</a:t>
+            </a:r>
+          </a:p>
+          <a:p>
+            <a:pPr lvl="2"/>
+            <a:r>
+              <a:rPr lang="en-US" sz="1400" dirty="0"/>
+              <a:t>All </a:t>
+            </a:r>
+            <a:r>
+              <a:rPr lang="en-US" sz="1400" dirty="0" err="1"/>
+              <a:t>mfma</a:t>
+            </a:r>
+            <a:r>
+              <a:rPr lang="en-US" sz="1400" dirty="0"/>
+              <a:t> </a:t>
+            </a:r>
+            <a:r>
+              <a:rPr lang="en-US" sz="1400" dirty="0" err="1"/>
+              <a:t>instr</a:t>
+            </a:r>
+            <a:r>
+              <a:rPr lang="en-US" sz="1400" dirty="0"/>
+              <a:t> are 32 </a:t>
+            </a:r>
+            <a:r>
+              <a:rPr lang="en-US" sz="1400" dirty="0" err="1"/>
+              <a:t>clk</a:t>
+            </a:r>
+            <a:r>
+              <a:rPr lang="en-US" sz="1400" dirty="0"/>
+              <a:t> interval</a:t>
+            </a:r>
+          </a:p>
+          <a:p>
+            <a:pPr lvl="1"/>
+            <a:r>
+              <a:rPr lang="en-US" sz="1800" dirty="0"/>
+              <a:t>Main loop elapsed time: 800clk</a:t>
+            </a:r>
+          </a:p>
+          <a:p>
+            <a:pPr lvl="1"/>
+            <a:r>
+              <a:rPr lang="en-US" sz="1800" dirty="0" err="1"/>
+              <a:t>Mfma</a:t>
+            </a:r>
+            <a:r>
+              <a:rPr lang="en-US" sz="1800" dirty="0"/>
+              <a:t> cycle: 252clk = 28(branch) + 7*32(mfma16)</a:t>
+            </a:r>
+          </a:p>
+          <a:p>
+            <a:pPr lvl="1"/>
+            <a:r>
+              <a:rPr lang="en-US" sz="1800" dirty="0"/>
+              <a:t>Math wave waits fetch wave (bubble 3) : 284clk </a:t>
+            </a:r>
+            <a:r>
+              <a:rPr lang="en-US" sz="1800" dirty="0">
+                <a:sym typeface="Wingdings" panose="05000000000000000000" pitchFamily="2" charset="2"/>
+              </a:rPr>
+              <a:t> </a:t>
+            </a:r>
+            <a:r>
+              <a:rPr lang="en-US" sz="1800" dirty="0"/>
+              <a:t>536 </a:t>
+            </a:r>
+            <a:r>
+              <a:rPr lang="en-US" sz="1800" dirty="0" err="1"/>
+              <a:t>clk</a:t>
+            </a:r>
+            <a:endParaRPr lang="en-US" sz="1800" dirty="0"/>
+          </a:p>
+          <a:p>
+            <a:pPr lvl="1"/>
+            <a:r>
+              <a:rPr lang="en-US" sz="1800" dirty="0"/>
+              <a:t>Bottle neck : fetch wave not math wave</a:t>
+            </a:r>
+          </a:p>
+        </p:txBody>
+      </p:sp>
+      <p:sp>
+        <p:nvSpPr>
+          <p:cNvPr id="3" name="Title 2">
+            <a:extLst>
+              <a:ext uri="{FF2B5EF4-FFF2-40B4-BE49-F238E27FC236}">
+                <a16:creationId xmlns:a16="http://schemas.microsoft.com/office/drawing/2014/main" id="{CEDC0840-5118-4BFD-899F-D50C1A686498}"/>
+              </a:ext>
+            </a:extLst>
+          </p:cNvPr>
+          <p:cNvSpPr>
+            <a:spLocks noGrp="1"/>
+          </p:cNvSpPr>
+          <p:nvPr>
+            <p:ph type="title"/>
+          </p:nvPr>
+        </p:nvSpPr>
+        <p:spPr/>
+        <p:txBody>
+          <a:bodyPr/>
+          <a:lstStyle/>
+          <a:p>
+            <a:r>
+              <a:rPr lang="en-US" altLang="zh-CN" dirty="0"/>
+              <a:t>480 </a:t>
+            </a:r>
+            <a:r>
+              <a:rPr lang="zh-CN" altLang="en-US" dirty="0"/>
+              <a:t>* </a:t>
+            </a:r>
+            <a:r>
+              <a:rPr lang="en-US" altLang="zh-CN" dirty="0"/>
+              <a:t>512 kernel analysis</a:t>
+            </a:r>
+            <a:endParaRPr lang="en-US" dirty="0"/>
+          </a:p>
+        </p:txBody>
+      </p:sp>
+      <p:sp>
+        <p:nvSpPr>
+          <p:cNvPr id="4" name="Text Placeholder 3">
+            <a:extLst>
+              <a:ext uri="{FF2B5EF4-FFF2-40B4-BE49-F238E27FC236}">
+                <a16:creationId xmlns:a16="http://schemas.microsoft.com/office/drawing/2014/main" id="{23BC3E91-3C7D-4DD3-9DC0-25A44DC2381D}"/>
+              </a:ext>
+            </a:extLst>
+          </p:cNvPr>
+          <p:cNvSpPr>
+            <a:spLocks noGrp="1"/>
+          </p:cNvSpPr>
+          <p:nvPr>
+            <p:ph type="body" sz="quarter" idx="10"/>
+          </p:nvPr>
+        </p:nvSpPr>
+        <p:spPr/>
+        <p:txBody>
+          <a:bodyPr/>
+          <a:lstStyle/>
+          <a:p>
+            <a:endParaRPr lang="en-US" dirty="0"/>
+          </a:p>
+        </p:txBody>
+      </p:sp>
+      <p:pic>
+        <p:nvPicPr>
+          <p:cNvPr id="7" name="Picture 6" descr="A picture containing computer, light&#10;&#10;Description automatically generated">
+            <a:extLst>
+              <a:ext uri="{FF2B5EF4-FFF2-40B4-BE49-F238E27FC236}">
+                <a16:creationId xmlns:a16="http://schemas.microsoft.com/office/drawing/2014/main" id="{B4CA8D83-C419-4922-8D65-821BC0994A57}"/>
+              </a:ext>
+            </a:extLst>
+          </p:cNvPr>
+          <p:cNvPicPr>
+            <a:picLocks noChangeAspect="1"/>
+          </p:cNvPicPr>
+          <p:nvPr/>
+        </p:nvPicPr>
+        <p:blipFill>
+          <a:blip r:embed="rId2">
+            <a:extLst>
+              <a:ext uri="{28A0092B-C50C-407E-A947-70E740481C1C}">
+                <a14:useLocalDpi xmlns:a14="http://schemas.microsoft.com/office/drawing/2010/main" val="0"/>
+              </a:ext>
+            </a:extLst>
+          </a:blip>
+          <a:stretch>
+            <a:fillRect/>
+          </a:stretch>
+        </p:blipFill>
+        <p:spPr>
+          <a:xfrm>
+            <a:off x="313244" y="4056474"/>
+            <a:ext cx="11562336" cy="2138698"/>
+          </a:xfrm>
+          <a:prstGeom prst="rect">
+            <a:avLst/>
+          </a:prstGeom>
+        </p:spPr>
+      </p:pic>
+      <p:sp>
+        <p:nvSpPr>
+          <p:cNvPr id="6" name="Rectangle: Rounded Corners 5">
+            <a:extLst>
+              <a:ext uri="{FF2B5EF4-FFF2-40B4-BE49-F238E27FC236}">
+                <a16:creationId xmlns:a16="http://schemas.microsoft.com/office/drawing/2014/main" id="{56737709-A016-43FD-AF38-5A7F92C51749}"/>
+              </a:ext>
+            </a:extLst>
+          </p:cNvPr>
+          <p:cNvSpPr/>
+          <p:nvPr/>
+        </p:nvSpPr>
+        <p:spPr>
+          <a:xfrm>
+            <a:off x="4970463" y="4140200"/>
+            <a:ext cx="6569604" cy="931333"/>
+          </a:xfrm>
+          <a:prstGeom prst="roundRect">
+            <a:avLst/>
+          </a:prstGeom>
+          <a:noFill/>
+          <a:ln>
+            <a:solidFill>
+              <a:srgbClr val="ED1C24"/>
+            </a:solidFill>
+          </a:ln>
+          <a:effectLst/>
+        </p:spPr>
+        <p:style>
+          <a:lnRef idx="2">
+            <a:schemeClr val="accent1">
+              <a:shade val="50000"/>
+            </a:schemeClr>
+          </a:lnRef>
+          <a:fillRef idx="1">
+            <a:schemeClr val="accent1"/>
+          </a:fillRef>
+          <a:effectRef idx="0">
+            <a:schemeClr val="accent1"/>
+          </a:effectRef>
+          <a:fontRef idx="minor">
+            <a:schemeClr val="lt1"/>
+          </a:fontRef>
+        </p:style>
+        <p:txBody>
+          <a:bodyPr rtlCol="0" anchor="ctr"/>
+          <a:lstStyle/>
+          <a:p>
+            <a:pPr algn="ctr"/>
+            <a:r>
+              <a:rPr lang="en-US" b="1" dirty="0">
+                <a:solidFill>
+                  <a:srgbClr val="FF0000"/>
+                </a:solidFill>
+              </a:rPr>
+              <a:t>3</a:t>
+            </a:r>
+          </a:p>
+        </p:txBody>
+      </p:sp>
+    </p:spTree>
+    <p:extLst>
+      <p:ext uri="{BB962C8B-B14F-4D97-AF65-F5344CB8AC3E}">
+        <p14:creationId xmlns:p14="http://schemas.microsoft.com/office/powerpoint/2010/main" val="4236393482"/>
       </p:ext>
     </p:extLst>
   </p:cSld>

</xml_diff>